<commit_message>
ch01 & ch02 done / ch03 working
</commit_message>
<xml_diff>
--- a/데이터베이스/1장/35_임현덕_20220509.pptx
+++ b/데이터베이스/1장/35_임현덕_20220509.pptx
@@ -19,8 +19,6 @@
     <p:sldId id="266" r:id="rId13"/>
     <p:sldId id="269" r:id="rId14"/>
     <p:sldId id="270" r:id="rId15"/>
-    <p:sldId id="271" r:id="rId16"/>
-    <p:sldId id="272" r:id="rId17"/>
   </p:sldIdLst>
   <p:sldSz cx="12192000" cy="6858000"/>
   <p:notesSz cx="6858000" cy="9144000"/>
@@ -258,7 +256,7 @@
           <a:p>
             <a:fld id="{D5545C22-6CA1-4F79-B89C-53193D963B1C}" type="datetimeFigureOut">
               <a:rPr lang="ko-KR" altLang="en-US" smtClean="0"/>
-              <a:t>2022-05-09</a:t>
+              <a:t>2022-05-12</a:t>
             </a:fld>
             <a:endParaRPr lang="ko-KR" altLang="en-US"/>
           </a:p>
@@ -428,7 +426,7 @@
           <a:p>
             <a:fld id="{D5545C22-6CA1-4F79-B89C-53193D963B1C}" type="datetimeFigureOut">
               <a:rPr lang="ko-KR" altLang="en-US" smtClean="0"/>
-              <a:t>2022-05-09</a:t>
+              <a:t>2022-05-12</a:t>
             </a:fld>
             <a:endParaRPr lang="ko-KR" altLang="en-US"/>
           </a:p>
@@ -608,7 +606,7 @@
           <a:p>
             <a:fld id="{D5545C22-6CA1-4F79-B89C-53193D963B1C}" type="datetimeFigureOut">
               <a:rPr lang="ko-KR" altLang="en-US" smtClean="0"/>
-              <a:t>2022-05-09</a:t>
+              <a:t>2022-05-12</a:t>
             </a:fld>
             <a:endParaRPr lang="ko-KR" altLang="en-US"/>
           </a:p>
@@ -778,7 +776,7 @@
           <a:p>
             <a:fld id="{D5545C22-6CA1-4F79-B89C-53193D963B1C}" type="datetimeFigureOut">
               <a:rPr lang="ko-KR" altLang="en-US" smtClean="0"/>
-              <a:t>2022-05-09</a:t>
+              <a:t>2022-05-12</a:t>
             </a:fld>
             <a:endParaRPr lang="ko-KR" altLang="en-US"/>
           </a:p>
@@ -1024,7 +1022,7 @@
           <a:p>
             <a:fld id="{D5545C22-6CA1-4F79-B89C-53193D963B1C}" type="datetimeFigureOut">
               <a:rPr lang="ko-KR" altLang="en-US" smtClean="0"/>
-              <a:t>2022-05-09</a:t>
+              <a:t>2022-05-12</a:t>
             </a:fld>
             <a:endParaRPr lang="ko-KR" altLang="en-US"/>
           </a:p>
@@ -1256,7 +1254,7 @@
           <a:p>
             <a:fld id="{D5545C22-6CA1-4F79-B89C-53193D963B1C}" type="datetimeFigureOut">
               <a:rPr lang="ko-KR" altLang="en-US" smtClean="0"/>
-              <a:t>2022-05-09</a:t>
+              <a:t>2022-05-12</a:t>
             </a:fld>
             <a:endParaRPr lang="ko-KR" altLang="en-US"/>
           </a:p>
@@ -1623,7 +1621,7 @@
           <a:p>
             <a:fld id="{D5545C22-6CA1-4F79-B89C-53193D963B1C}" type="datetimeFigureOut">
               <a:rPr lang="ko-KR" altLang="en-US" smtClean="0"/>
-              <a:t>2022-05-09</a:t>
+              <a:t>2022-05-12</a:t>
             </a:fld>
             <a:endParaRPr lang="ko-KR" altLang="en-US"/>
           </a:p>
@@ -1741,7 +1739,7 @@
           <a:p>
             <a:fld id="{D5545C22-6CA1-4F79-B89C-53193D963B1C}" type="datetimeFigureOut">
               <a:rPr lang="ko-KR" altLang="en-US" smtClean="0"/>
-              <a:t>2022-05-09</a:t>
+              <a:t>2022-05-12</a:t>
             </a:fld>
             <a:endParaRPr lang="ko-KR" altLang="en-US"/>
           </a:p>
@@ -1836,7 +1834,7 @@
           <a:p>
             <a:fld id="{D5545C22-6CA1-4F79-B89C-53193D963B1C}" type="datetimeFigureOut">
               <a:rPr lang="ko-KR" altLang="en-US" smtClean="0"/>
-              <a:t>2022-05-09</a:t>
+              <a:t>2022-05-12</a:t>
             </a:fld>
             <a:endParaRPr lang="ko-KR" altLang="en-US"/>
           </a:p>
@@ -2113,7 +2111,7 @@
           <a:p>
             <a:fld id="{D5545C22-6CA1-4F79-B89C-53193D963B1C}" type="datetimeFigureOut">
               <a:rPr lang="ko-KR" altLang="en-US" smtClean="0"/>
-              <a:t>2022-05-09</a:t>
+              <a:t>2022-05-12</a:t>
             </a:fld>
             <a:endParaRPr lang="ko-KR" altLang="en-US"/>
           </a:p>
@@ -2366,7 +2364,7 @@
           <a:p>
             <a:fld id="{D5545C22-6CA1-4F79-B89C-53193D963B1C}" type="datetimeFigureOut">
               <a:rPr lang="ko-KR" altLang="en-US" smtClean="0"/>
-              <a:t>2022-05-09</a:t>
+              <a:t>2022-05-12</a:t>
             </a:fld>
             <a:endParaRPr lang="ko-KR" altLang="en-US"/>
           </a:p>
@@ -2579,7 +2577,7 @@
           <a:p>
             <a:fld id="{D5545C22-6CA1-4F79-B89C-53193D963B1C}" type="datetimeFigureOut">
               <a:rPr lang="ko-KR" altLang="en-US" smtClean="0"/>
-              <a:t>2022-05-09</a:t>
+              <a:t>2022-05-12</a:t>
             </a:fld>
             <a:endParaRPr lang="ko-KR" altLang="en-US"/>
           </a:p>
@@ -4631,93 +4629,40 @@
           <a:chExt cx="0" cy="0"/>
         </a:xfrm>
       </p:grpSpPr>
+      <p:pic>
+        <p:nvPicPr>
+          <p:cNvPr id="2" name="그림 1"/>
+          <p:cNvPicPr>
+            <a:picLocks noChangeAspect="1"/>
+          </p:cNvPicPr>
+          <p:nvPr/>
+        </p:nvPicPr>
+        <p:blipFill>
+          <a:blip r:embed="rId2">
+            <a:extLst>
+              <a:ext uri="{28A0092B-C50C-407E-A947-70E740481C1C}">
+                <a14:useLocalDpi xmlns:a14="http://schemas.microsoft.com/office/drawing/2010/main" val="0"/>
+              </a:ext>
+            </a:extLst>
+          </a:blip>
+          <a:stretch>
+            <a:fillRect/>
+          </a:stretch>
+        </p:blipFill>
+        <p:spPr>
+          <a:xfrm>
+            <a:off x="3652837" y="0"/>
+            <a:ext cx="4886325" cy="6858000"/>
+          </a:xfrm>
+          <a:prstGeom prst="rect">
+            <a:avLst/>
+          </a:prstGeom>
+        </p:spPr>
+      </p:pic>
     </p:spTree>
     <p:extLst>
       <p:ext uri="{BB962C8B-B14F-4D97-AF65-F5344CB8AC3E}">
         <p14:creationId xmlns:p14="http://schemas.microsoft.com/office/powerpoint/2010/main" val="785479084"/>
-      </p:ext>
-    </p:extLst>
-  </p:cSld>
-  <p:clrMapOvr>
-    <a:masterClrMapping/>
-  </p:clrMapOvr>
-</p:sld>
-</file>
-
-<file path=ppt/slides/slide15.xml><?xml version="1.0" encoding="utf-8"?>
-<p:sld xmlns:a="http://schemas.openxmlformats.org/drawingml/2006/main" xmlns:r="http://schemas.openxmlformats.org/officeDocument/2006/relationships" xmlns:p="http://schemas.openxmlformats.org/presentationml/2006/main">
-  <p:cSld>
-    <p:spTree>
-      <p:nvGrpSpPr>
-        <p:cNvPr id="1" name=""/>
-        <p:cNvGrpSpPr/>
-        <p:nvPr/>
-      </p:nvGrpSpPr>
-      <p:grpSpPr>
-        <a:xfrm>
-          <a:off x="0" y="0"/>
-          <a:ext cx="0" cy="0"/>
-          <a:chOff x="0" y="0"/>
-          <a:chExt cx="0" cy="0"/>
-        </a:xfrm>
-      </p:grpSpPr>
-      <p:sp>
-        <p:nvSpPr>
-          <p:cNvPr id="2" name="제목 1"/>
-          <p:cNvSpPr>
-            <a:spLocks noGrp="1"/>
-          </p:cNvSpPr>
-          <p:nvPr>
-            <p:ph type="ctrTitle"/>
-          </p:nvPr>
-        </p:nvSpPr>
-        <p:spPr/>
-        <p:txBody>
-          <a:bodyPr/>
-          <a:lstStyle/>
-          <a:p>
-            <a:r>
-              <a:rPr lang="ko-KR" altLang="en-US" dirty="0" smtClean="0"/>
-              <a:t>수업 중 필기</a:t>
-            </a:r>
-            <a:endParaRPr lang="ko-KR" altLang="en-US" dirty="0"/>
-          </a:p>
-        </p:txBody>
-      </p:sp>
-    </p:spTree>
-    <p:extLst>
-      <p:ext uri="{BB962C8B-B14F-4D97-AF65-F5344CB8AC3E}">
-        <p14:creationId xmlns:p14="http://schemas.microsoft.com/office/powerpoint/2010/main" val="2220144532"/>
-      </p:ext>
-    </p:extLst>
-  </p:cSld>
-  <p:clrMapOvr>
-    <a:masterClrMapping/>
-  </p:clrMapOvr>
-</p:sld>
-</file>
-
-<file path=ppt/slides/slide16.xml><?xml version="1.0" encoding="utf-8"?>
-<p:sld xmlns:a="http://schemas.openxmlformats.org/drawingml/2006/main" xmlns:r="http://schemas.openxmlformats.org/officeDocument/2006/relationships" xmlns:p="http://schemas.openxmlformats.org/presentationml/2006/main">
-  <p:cSld>
-    <p:spTree>
-      <p:nvGrpSpPr>
-        <p:cNvPr id="1" name=""/>
-        <p:cNvGrpSpPr/>
-        <p:nvPr/>
-      </p:nvGrpSpPr>
-      <p:grpSpPr>
-        <a:xfrm>
-          <a:off x="0" y="0"/>
-          <a:ext cx="0" cy="0"/>
-          <a:chOff x="0" y="0"/>
-          <a:chExt cx="0" cy="0"/>
-        </a:xfrm>
-      </p:grpSpPr>
-    </p:spTree>
-    <p:extLst>
-      <p:ext uri="{BB962C8B-B14F-4D97-AF65-F5344CB8AC3E}">
-        <p14:creationId xmlns:p14="http://schemas.microsoft.com/office/powerpoint/2010/main" val="786668192"/>
       </p:ext>
     </p:extLst>
   </p:cSld>
@@ -4744,6 +4689,36 @@
           <a:chExt cx="0" cy="0"/>
         </a:xfrm>
       </p:grpSpPr>
+      <p:pic>
+        <p:nvPicPr>
+          <p:cNvPr id="2" name="그림 1"/>
+          <p:cNvPicPr>
+            <a:picLocks noChangeAspect="1"/>
+          </p:cNvPicPr>
+          <p:nvPr/>
+        </p:nvPicPr>
+        <p:blipFill>
+          <a:blip r:embed="rId2">
+            <a:extLst>
+              <a:ext uri="{28A0092B-C50C-407E-A947-70E740481C1C}">
+                <a14:useLocalDpi xmlns:a14="http://schemas.microsoft.com/office/drawing/2010/main" val="0"/>
+              </a:ext>
+            </a:extLst>
+          </a:blip>
+          <a:stretch>
+            <a:fillRect/>
+          </a:stretch>
+        </p:blipFill>
+        <p:spPr>
+          <a:xfrm>
+            <a:off x="3712368" y="0"/>
+            <a:ext cx="4767263" cy="6858000"/>
+          </a:xfrm>
+          <a:prstGeom prst="rect">
+            <a:avLst/>
+          </a:prstGeom>
+        </p:spPr>
+      </p:pic>
     </p:spTree>
     <p:extLst>
       <p:ext uri="{BB962C8B-B14F-4D97-AF65-F5344CB8AC3E}">

</xml_diff>